<commit_message>
Diagrams and Reqs Doc
Various updates to diagrams and requirements docs
</commit_message>
<xml_diff>
--- a/presentation/Requirements_TimelineGroup.pptx
+++ b/presentation/Requirements_TimelineGroup.pptx
@@ -7,11 +7,16 @@
   <p:sldIdLst>
     <p:sldId id="256" r:id="rId2"/>
     <p:sldId id="257" r:id="rId3"/>
-    <p:sldId id="258" r:id="rId4"/>
-    <p:sldId id="259" r:id="rId5"/>
-    <p:sldId id="260" r:id="rId6"/>
-    <p:sldId id="261" r:id="rId7"/>
-    <p:sldId id="262" r:id="rId8"/>
+    <p:sldId id="263" r:id="rId4"/>
+    <p:sldId id="264" r:id="rId5"/>
+    <p:sldId id="258" r:id="rId6"/>
+    <p:sldId id="259" r:id="rId7"/>
+    <p:sldId id="260" r:id="rId8"/>
+    <p:sldId id="262" r:id="rId9"/>
+    <p:sldId id="275" r:id="rId10"/>
+    <p:sldId id="261" r:id="rId11"/>
+    <p:sldId id="276" r:id="rId12"/>
+    <p:sldId id="277" r:id="rId13"/>
   </p:sldIdLst>
   <p:sldSz cx="12192000" cy="6858000"/>
   <p:notesSz cx="6858000" cy="9144000"/>
@@ -117,14 +122,22 @@
           <p14:sldIdLst>
             <p14:sldId id="256"/>
             <p14:sldId id="257"/>
+            <p14:sldId id="263"/>
+            <p14:sldId id="264"/>
             <p14:sldId id="258"/>
             <p14:sldId id="259"/>
             <p14:sldId id="260"/>
+            <p14:sldId id="262"/>
+            <p14:sldId id="275"/>
             <p14:sldId id="261"/>
-            <p14:sldId id="262"/>
+            <p14:sldId id="276"/>
+            <p14:sldId id="277"/>
           </p14:sldIdLst>
         </p14:section>
       </p14:sectionLst>
+    </p:ext>
+    <p:ext uri="{EFAFB233-063F-42B5-8137-9DF3F51BA10A}">
+      <p15:sldGuideLst xmlns:p15="http://schemas.microsoft.com/office/powerpoint/2012/main"/>
     </p:ext>
   </p:extLst>
 </p:presentation>
@@ -636,7 +649,7 @@
           <a:p>
             <a:fld id="{888D1ED3-49C6-4C5A-8613-D7B21A078EEC}" type="datetimeFigureOut">
               <a:rPr lang="en-US" smtClean="0"/>
-              <a:t>2/21/2018</a:t>
+              <a:t>2/22/2018</a:t>
             </a:fld>
             <a:endParaRPr lang="en-US"/>
           </a:p>
@@ -932,7 +945,7 @@
           <a:p>
             <a:fld id="{888D1ED3-49C6-4C5A-8613-D7B21A078EEC}" type="datetimeFigureOut">
               <a:rPr lang="en-US" smtClean="0"/>
-              <a:t>2/21/2018</a:t>
+              <a:t>2/22/2018</a:t>
             </a:fld>
             <a:endParaRPr lang="en-US"/>
           </a:p>
@@ -1180,7 +1193,7 @@
           <a:p>
             <a:fld id="{888D1ED3-49C6-4C5A-8613-D7B21A078EEC}" type="datetimeFigureOut">
               <a:rPr lang="en-US" smtClean="0"/>
-              <a:t>2/21/2018</a:t>
+              <a:t>2/22/2018</a:t>
             </a:fld>
             <a:endParaRPr lang="en-US"/>
           </a:p>
@@ -1720,7 +1733,7 @@
           <a:p>
             <a:fld id="{888D1ED3-49C6-4C5A-8613-D7B21A078EEC}" type="datetimeFigureOut">
               <a:rPr lang="en-US" smtClean="0"/>
-              <a:t>2/21/2018</a:t>
+              <a:t>2/22/2018</a:t>
             </a:fld>
             <a:endParaRPr lang="en-US"/>
           </a:p>
@@ -1968,7 +1981,7 @@
           <a:p>
             <a:fld id="{888D1ED3-49C6-4C5A-8613-D7B21A078EEC}" type="datetimeFigureOut">
               <a:rPr lang="en-US" smtClean="0"/>
-              <a:t>2/21/2018</a:t>
+              <a:t>2/22/2018</a:t>
             </a:fld>
             <a:endParaRPr lang="en-US"/>
           </a:p>
@@ -2500,7 +2513,7 @@
           <a:p>
             <a:fld id="{888D1ED3-49C6-4C5A-8613-D7B21A078EEC}" type="datetimeFigureOut">
               <a:rPr lang="en-US" smtClean="0"/>
-              <a:t>2/21/2018</a:t>
+              <a:t>2/22/2018</a:t>
             </a:fld>
             <a:endParaRPr lang="en-US"/>
           </a:p>
@@ -2797,7 +2810,7 @@
           <a:p>
             <a:fld id="{888D1ED3-49C6-4C5A-8613-D7B21A078EEC}" type="datetimeFigureOut">
               <a:rPr lang="en-US" smtClean="0"/>
-              <a:t>2/21/2018</a:t>
+              <a:t>2/22/2018</a:t>
             </a:fld>
             <a:endParaRPr lang="en-US"/>
           </a:p>
@@ -2971,7 +2984,7 @@
           <a:p>
             <a:fld id="{888D1ED3-49C6-4C5A-8613-D7B21A078EEC}" type="datetimeFigureOut">
               <a:rPr lang="en-US" smtClean="0"/>
-              <a:t>2/21/2018</a:t>
+              <a:t>2/22/2018</a:t>
             </a:fld>
             <a:endParaRPr lang="en-US"/>
           </a:p>
@@ -3151,7 +3164,7 @@
           <a:p>
             <a:fld id="{888D1ED3-49C6-4C5A-8613-D7B21A078EEC}" type="datetimeFigureOut">
               <a:rPr lang="en-US" smtClean="0"/>
-              <a:t>2/21/2018</a:t>
+              <a:t>2/22/2018</a:t>
             </a:fld>
             <a:endParaRPr lang="en-US"/>
           </a:p>
@@ -3321,7 +3334,7 @@
           <a:p>
             <a:fld id="{888D1ED3-49C6-4C5A-8613-D7B21A078EEC}" type="datetimeFigureOut">
               <a:rPr lang="en-US" smtClean="0"/>
-              <a:t>2/21/2018</a:t>
+              <a:t>2/22/2018</a:t>
             </a:fld>
             <a:endParaRPr lang="en-US"/>
           </a:p>
@@ -3572,7 +3585,7 @@
           <a:p>
             <a:fld id="{888D1ED3-49C6-4C5A-8613-D7B21A078EEC}" type="datetimeFigureOut">
               <a:rPr lang="en-US" smtClean="0"/>
-              <a:t>2/21/2018</a:t>
+              <a:t>2/22/2018</a:t>
             </a:fld>
             <a:endParaRPr lang="en-US"/>
           </a:p>
@@ -3869,7 +3882,7 @@
           <a:p>
             <a:fld id="{888D1ED3-49C6-4C5A-8613-D7B21A078EEC}" type="datetimeFigureOut">
               <a:rPr lang="en-US" smtClean="0"/>
-              <a:t>2/21/2018</a:t>
+              <a:t>2/22/2018</a:t>
             </a:fld>
             <a:endParaRPr lang="en-US"/>
           </a:p>
@@ -4311,7 +4324,7 @@
           <a:p>
             <a:fld id="{888D1ED3-49C6-4C5A-8613-D7B21A078EEC}" type="datetimeFigureOut">
               <a:rPr lang="en-US" smtClean="0"/>
-              <a:t>2/21/2018</a:t>
+              <a:t>2/22/2018</a:t>
             </a:fld>
             <a:endParaRPr lang="en-US"/>
           </a:p>
@@ -4429,7 +4442,7 @@
           <a:p>
             <a:fld id="{888D1ED3-49C6-4C5A-8613-D7B21A078EEC}" type="datetimeFigureOut">
               <a:rPr lang="en-US" smtClean="0"/>
-              <a:t>2/21/2018</a:t>
+              <a:t>2/22/2018</a:t>
             </a:fld>
             <a:endParaRPr lang="en-US"/>
           </a:p>
@@ -4524,7 +4537,7 @@
           <a:p>
             <a:fld id="{888D1ED3-49C6-4C5A-8613-D7B21A078EEC}" type="datetimeFigureOut">
               <a:rPr lang="en-US" smtClean="0"/>
-              <a:t>2/21/2018</a:t>
+              <a:t>2/22/2018</a:t>
             </a:fld>
             <a:endParaRPr lang="en-US"/>
           </a:p>
@@ -4807,7 +4820,7 @@
           <a:p>
             <a:fld id="{888D1ED3-49C6-4C5A-8613-D7B21A078EEC}" type="datetimeFigureOut">
               <a:rPr lang="en-US" smtClean="0"/>
-              <a:t>2/21/2018</a:t>
+              <a:t>2/22/2018</a:t>
             </a:fld>
             <a:endParaRPr lang="en-US"/>
           </a:p>
@@ -5098,7 +5111,7 @@
           <a:p>
             <a:fld id="{888D1ED3-49C6-4C5A-8613-D7B21A078EEC}" type="datetimeFigureOut">
               <a:rPr lang="en-US" smtClean="0"/>
-              <a:t>2/21/2018</a:t>
+              <a:t>2/22/2018</a:t>
             </a:fld>
             <a:endParaRPr lang="en-US"/>
           </a:p>
@@ -5628,7 +5641,7 @@
           <a:p>
             <a:fld id="{888D1ED3-49C6-4C5A-8613-D7B21A078EEC}" type="datetimeFigureOut">
               <a:rPr lang="en-US" smtClean="0"/>
-              <a:t>2/21/2018</a:t>
+              <a:t>2/22/2018</a:t>
             </a:fld>
             <a:endParaRPr lang="en-US"/>
           </a:p>
@@ -6561,512 +6574,7 @@
 </p:sld>
 </file>
 
-<file path=ppt/slides/slide2.xml><?xml version="1.0" encoding="utf-8"?>
-<p:sld xmlns:a="http://schemas.openxmlformats.org/drawingml/2006/main" xmlns:r="http://schemas.openxmlformats.org/officeDocument/2006/relationships" xmlns:p="http://schemas.openxmlformats.org/presentationml/2006/main">
-  <p:cSld>
-    <p:spTree>
-      <p:nvGrpSpPr>
-        <p:cNvPr id="1" name=""/>
-        <p:cNvGrpSpPr/>
-        <p:nvPr/>
-      </p:nvGrpSpPr>
-      <p:grpSpPr>
-        <a:xfrm>
-          <a:off x="0" y="0"/>
-          <a:ext cx="0" cy="0"/>
-          <a:chOff x="0" y="0"/>
-          <a:chExt cx="0" cy="0"/>
-        </a:xfrm>
-      </p:grpSpPr>
-      <p:sp>
-        <p:nvSpPr>
-          <p:cNvPr id="2" name="Title 1">
-            <a:extLst>
-              <a:ext uri="{FF2B5EF4-FFF2-40B4-BE49-F238E27FC236}">
-                <a16:creationId xmlns:a16="http://schemas.microsoft.com/office/drawing/2014/main" id="{E015D09F-E483-4412-8F5B-2210854CBE49}"/>
-              </a:ext>
-            </a:extLst>
-          </p:cNvPr>
-          <p:cNvSpPr>
-            <a:spLocks noGrp="1"/>
-          </p:cNvSpPr>
-          <p:nvPr>
-            <p:ph type="title"/>
-          </p:nvPr>
-        </p:nvSpPr>
-        <p:spPr/>
-        <p:txBody>
-          <a:bodyPr/>
-          <a:lstStyle/>
-          <a:p>
-            <a:r>
-              <a:rPr lang="en-US" dirty="0"/>
-              <a:t>Topics	</a:t>
-            </a:r>
-          </a:p>
-        </p:txBody>
-      </p:sp>
-      <p:sp>
-        <p:nvSpPr>
-          <p:cNvPr id="5" name="TextBox 4">
-            <a:extLst>
-              <a:ext uri="{FF2B5EF4-FFF2-40B4-BE49-F238E27FC236}">
-                <a16:creationId xmlns:a16="http://schemas.microsoft.com/office/drawing/2014/main" id="{B8417A24-9A87-4A1A-B0CB-B2750AEC5A19}"/>
-              </a:ext>
-            </a:extLst>
-          </p:cNvPr>
-          <p:cNvSpPr txBox="1"/>
-          <p:nvPr/>
-        </p:nvSpPr>
-        <p:spPr>
-          <a:xfrm>
-            <a:off x="1804737" y="2213811"/>
-            <a:ext cx="9432758" cy="3416320"/>
-          </a:xfrm>
-          <a:prstGeom prst="rect">
-            <a:avLst/>
-          </a:prstGeom>
-          <a:noFill/>
-        </p:spPr>
-        <p:txBody>
-          <a:bodyPr wrap="square" rtlCol="0">
-            <a:spAutoFit/>
-          </a:bodyPr>
-          <a:lstStyle/>
-          <a:p>
-            <a:pPr marL="285750" indent="-285750">
-              <a:buFont typeface="Arial" panose="020B0604020202020204" pitchFamily="34" charset="0"/>
-              <a:buChar char="•"/>
-            </a:pPr>
-            <a:r>
-              <a:rPr lang="en-US" sz="3600" dirty="0"/>
-              <a:t>Project Description</a:t>
-            </a:r>
-          </a:p>
-          <a:p>
-            <a:pPr marL="285750" indent="-285750">
-              <a:buFont typeface="Arial" panose="020B0604020202020204" pitchFamily="34" charset="0"/>
-              <a:buChar char="•"/>
-            </a:pPr>
-            <a:r>
-              <a:rPr lang="en-US" sz="3600" dirty="0"/>
-              <a:t>Requirements </a:t>
-            </a:r>
-          </a:p>
-          <a:p>
-            <a:pPr marL="800100" lvl="1" indent="-342900">
-              <a:buFont typeface="Arial" panose="020B0604020202020204" pitchFamily="34" charset="0"/>
-              <a:buChar char="•"/>
-            </a:pPr>
-            <a:r>
-              <a:rPr lang="en-US" sz="3600" dirty="0"/>
-              <a:t>Functional</a:t>
-            </a:r>
-          </a:p>
-          <a:p>
-            <a:pPr marL="800100" lvl="1" indent="-342900">
-              <a:buFont typeface="Arial" panose="020B0604020202020204" pitchFamily="34" charset="0"/>
-              <a:buChar char="•"/>
-            </a:pPr>
-            <a:r>
-              <a:rPr lang="en-US" sz="3600" dirty="0"/>
-              <a:t>Non-Functional</a:t>
-            </a:r>
-          </a:p>
-          <a:p>
-            <a:pPr marL="342900" indent="-342900">
-              <a:buFont typeface="Arial" panose="020B0604020202020204" pitchFamily="34" charset="0"/>
-              <a:buChar char="•"/>
-            </a:pPr>
-            <a:r>
-              <a:rPr lang="en-US" sz="3600" dirty="0"/>
-              <a:t>Competitors Table</a:t>
-            </a:r>
-          </a:p>
-          <a:p>
-            <a:pPr marL="342900" indent="-342900">
-              <a:buFont typeface="Arial" panose="020B0604020202020204" pitchFamily="34" charset="0"/>
-              <a:buChar char="•"/>
-            </a:pPr>
-            <a:r>
-              <a:rPr lang="en-US" sz="3600" dirty="0"/>
-              <a:t>Diagrams / Images</a:t>
-            </a:r>
-          </a:p>
-        </p:txBody>
-      </p:sp>
-    </p:spTree>
-    <p:extLst>
-      <p:ext uri="{BB962C8B-B14F-4D97-AF65-F5344CB8AC3E}">
-        <p14:creationId xmlns:p14="http://schemas.microsoft.com/office/powerpoint/2010/main" val="1956034634"/>
-      </p:ext>
-    </p:extLst>
-  </p:cSld>
-  <p:clrMapOvr>
-    <a:masterClrMapping/>
-  </p:clrMapOvr>
-</p:sld>
-</file>
-
-<file path=ppt/slides/slide3.xml><?xml version="1.0" encoding="utf-8"?>
-<p:sld xmlns:a="http://schemas.openxmlformats.org/drawingml/2006/main" xmlns:r="http://schemas.openxmlformats.org/officeDocument/2006/relationships" xmlns:p="http://schemas.openxmlformats.org/presentationml/2006/main">
-  <p:cSld>
-    <p:spTree>
-      <p:nvGrpSpPr>
-        <p:cNvPr id="1" name=""/>
-        <p:cNvGrpSpPr/>
-        <p:nvPr/>
-      </p:nvGrpSpPr>
-      <p:grpSpPr>
-        <a:xfrm>
-          <a:off x="0" y="0"/>
-          <a:ext cx="0" cy="0"/>
-          <a:chOff x="0" y="0"/>
-          <a:chExt cx="0" cy="0"/>
-        </a:xfrm>
-      </p:grpSpPr>
-      <p:sp>
-        <p:nvSpPr>
-          <p:cNvPr id="2" name="Title 1">
-            <a:extLst>
-              <a:ext uri="{FF2B5EF4-FFF2-40B4-BE49-F238E27FC236}">
-                <a16:creationId xmlns:a16="http://schemas.microsoft.com/office/drawing/2014/main" id="{13E21B5D-3ABB-4C81-B400-42E2ED3A5380}"/>
-              </a:ext>
-            </a:extLst>
-          </p:cNvPr>
-          <p:cNvSpPr>
-            <a:spLocks noGrp="1"/>
-          </p:cNvSpPr>
-          <p:nvPr>
-            <p:ph type="title"/>
-          </p:nvPr>
-        </p:nvSpPr>
-        <p:spPr>
-          <a:xfrm>
-            <a:off x="1484311" y="685800"/>
-            <a:ext cx="10018713" cy="1118937"/>
-          </a:xfrm>
-        </p:spPr>
-        <p:txBody>
-          <a:bodyPr/>
-          <a:lstStyle/>
-          <a:p>
-            <a:r>
-              <a:rPr lang="en-US" dirty="0"/>
-              <a:t>Project Description</a:t>
-            </a:r>
-          </a:p>
-        </p:txBody>
-      </p:sp>
-      <p:sp>
-        <p:nvSpPr>
-          <p:cNvPr id="3" name="Content Placeholder 2">
-            <a:extLst>
-              <a:ext uri="{FF2B5EF4-FFF2-40B4-BE49-F238E27FC236}">
-                <a16:creationId xmlns:a16="http://schemas.microsoft.com/office/drawing/2014/main" id="{EB93E076-6805-4EAF-A0A5-8B50CAAA9E43}"/>
-              </a:ext>
-            </a:extLst>
-          </p:cNvPr>
-          <p:cNvSpPr>
-            <a:spLocks noGrp="1"/>
-          </p:cNvSpPr>
-          <p:nvPr>
-            <p:ph idx="1"/>
-          </p:nvPr>
-        </p:nvSpPr>
-        <p:spPr>
-          <a:xfrm>
-            <a:off x="1484311" y="2137610"/>
-            <a:ext cx="10018713" cy="3926306"/>
-          </a:xfrm>
-        </p:spPr>
-        <p:txBody>
-          <a:bodyPr>
-            <a:noAutofit/>
-          </a:bodyPr>
-          <a:lstStyle/>
-          <a:p>
-            <a:r>
-              <a:rPr lang="en-US" sz="3600" dirty="0"/>
-              <a:t>Time visualization</a:t>
-            </a:r>
-          </a:p>
-          <a:p>
-            <a:pPr lvl="1"/>
-            <a:r>
-              <a:rPr lang="en-US" sz="3600" dirty="0"/>
-              <a:t>See time linearly, instead of as a grid. </a:t>
-            </a:r>
-          </a:p>
-          <a:p>
-            <a:r>
-              <a:rPr lang="en-US" sz="3600" dirty="0"/>
-              <a:t>Time management</a:t>
-            </a:r>
-          </a:p>
-          <a:p>
-            <a:pPr lvl="1"/>
-            <a:r>
-              <a:rPr lang="en-US" sz="3600" dirty="0"/>
-              <a:t>Create events like any other scheduling app</a:t>
-            </a:r>
-          </a:p>
-          <a:p>
-            <a:pPr lvl="1"/>
-            <a:r>
-              <a:rPr lang="en-US" sz="3600" dirty="0"/>
-              <a:t>Share timeline </a:t>
-            </a:r>
-          </a:p>
-          <a:p>
-            <a:pPr lvl="1"/>
-            <a:r>
-              <a:rPr lang="en-US" sz="3600" dirty="0"/>
-              <a:t>Automatically analyze combined timelines to see conflicts or shared free-time</a:t>
-            </a:r>
-          </a:p>
-        </p:txBody>
-      </p:sp>
-    </p:spTree>
-    <p:extLst>
-      <p:ext uri="{BB962C8B-B14F-4D97-AF65-F5344CB8AC3E}">
-        <p14:creationId xmlns:p14="http://schemas.microsoft.com/office/powerpoint/2010/main" val="3606233267"/>
-      </p:ext>
-    </p:extLst>
-  </p:cSld>
-  <p:clrMapOvr>
-    <a:masterClrMapping/>
-  </p:clrMapOvr>
-</p:sld>
-</file>
-
-<file path=ppt/slides/slide4.xml><?xml version="1.0" encoding="utf-8"?>
-<p:sld xmlns:a="http://schemas.openxmlformats.org/drawingml/2006/main" xmlns:r="http://schemas.openxmlformats.org/officeDocument/2006/relationships" xmlns:p="http://schemas.openxmlformats.org/presentationml/2006/main">
-  <p:cSld>
-    <p:spTree>
-      <p:nvGrpSpPr>
-        <p:cNvPr id="1" name=""/>
-        <p:cNvGrpSpPr/>
-        <p:nvPr/>
-      </p:nvGrpSpPr>
-      <p:grpSpPr>
-        <a:xfrm>
-          <a:off x="0" y="0"/>
-          <a:ext cx="0" cy="0"/>
-          <a:chOff x="0" y="0"/>
-          <a:chExt cx="0" cy="0"/>
-        </a:xfrm>
-      </p:grpSpPr>
-      <p:sp>
-        <p:nvSpPr>
-          <p:cNvPr id="2" name="Title 1">
-            <a:extLst>
-              <a:ext uri="{FF2B5EF4-FFF2-40B4-BE49-F238E27FC236}">
-                <a16:creationId xmlns:a16="http://schemas.microsoft.com/office/drawing/2014/main" id="{8941213E-73E3-4E55-93C8-996A6C3D9E26}"/>
-              </a:ext>
-            </a:extLst>
-          </p:cNvPr>
-          <p:cNvSpPr>
-            <a:spLocks noGrp="1"/>
-          </p:cNvSpPr>
-          <p:nvPr>
-            <p:ph type="title"/>
-          </p:nvPr>
-        </p:nvSpPr>
-        <p:spPr/>
-        <p:txBody>
-          <a:bodyPr/>
-          <a:lstStyle/>
-          <a:p>
-            <a:r>
-              <a:rPr lang="en-US" dirty="0"/>
-              <a:t>Functional Requirements</a:t>
-            </a:r>
-          </a:p>
-        </p:txBody>
-      </p:sp>
-      <p:sp>
-        <p:nvSpPr>
-          <p:cNvPr id="3" name="Content Placeholder 2">
-            <a:extLst>
-              <a:ext uri="{FF2B5EF4-FFF2-40B4-BE49-F238E27FC236}">
-                <a16:creationId xmlns:a16="http://schemas.microsoft.com/office/drawing/2014/main" id="{8AFBBA2B-A3FE-4C31-86F8-3B32EFA4BB73}"/>
-              </a:ext>
-            </a:extLst>
-          </p:cNvPr>
-          <p:cNvSpPr>
-            <a:spLocks noGrp="1"/>
-          </p:cNvSpPr>
-          <p:nvPr>
-            <p:ph idx="1"/>
-          </p:nvPr>
-        </p:nvSpPr>
-        <p:spPr/>
-        <p:txBody>
-          <a:bodyPr>
-            <a:noAutofit/>
-          </a:bodyPr>
-          <a:lstStyle/>
-          <a:p>
-            <a:r>
-              <a:rPr lang="en-US" sz="3600" dirty="0"/>
-              <a:t>Create a Timeline</a:t>
-            </a:r>
-          </a:p>
-          <a:p>
-            <a:r>
-              <a:rPr lang="en-US" sz="3600" dirty="0"/>
-              <a:t>Create/Add Events</a:t>
-            </a:r>
-          </a:p>
-          <a:p>
-            <a:r>
-              <a:rPr lang="en-US" sz="3600" dirty="0"/>
-              <a:t>Simple </a:t>
-            </a:r>
-            <a:r>
-              <a:rPr lang="en-US" sz="3600" dirty="0" err="1"/>
-              <a:t>Querys</a:t>
-            </a:r>
-            <a:r>
-              <a:rPr lang="en-US" sz="3600" dirty="0"/>
-              <a:t> of Timeline</a:t>
-            </a:r>
-          </a:p>
-          <a:p>
-            <a:r>
-              <a:rPr lang="en-US" sz="3600" dirty="0"/>
-              <a:t>Share Timeline </a:t>
-            </a:r>
-          </a:p>
-          <a:p>
-            <a:r>
-              <a:rPr lang="en-US" sz="3600" dirty="0"/>
-              <a:t>Invite others to shared Timeline Events</a:t>
-            </a:r>
-          </a:p>
-        </p:txBody>
-      </p:sp>
-    </p:spTree>
-    <p:extLst>
-      <p:ext uri="{BB962C8B-B14F-4D97-AF65-F5344CB8AC3E}">
-        <p14:creationId xmlns:p14="http://schemas.microsoft.com/office/powerpoint/2010/main" val="4179094161"/>
-      </p:ext>
-    </p:extLst>
-  </p:cSld>
-  <p:clrMapOvr>
-    <a:masterClrMapping/>
-  </p:clrMapOvr>
-</p:sld>
-</file>
-
-<file path=ppt/slides/slide5.xml><?xml version="1.0" encoding="utf-8"?>
-<p:sld xmlns:a="http://schemas.openxmlformats.org/drawingml/2006/main" xmlns:r="http://schemas.openxmlformats.org/officeDocument/2006/relationships" xmlns:p="http://schemas.openxmlformats.org/presentationml/2006/main">
-  <p:cSld>
-    <p:spTree>
-      <p:nvGrpSpPr>
-        <p:cNvPr id="1" name=""/>
-        <p:cNvGrpSpPr/>
-        <p:nvPr/>
-      </p:nvGrpSpPr>
-      <p:grpSpPr>
-        <a:xfrm>
-          <a:off x="0" y="0"/>
-          <a:ext cx="0" cy="0"/>
-          <a:chOff x="0" y="0"/>
-          <a:chExt cx="0" cy="0"/>
-        </a:xfrm>
-      </p:grpSpPr>
-      <p:sp>
-        <p:nvSpPr>
-          <p:cNvPr id="2" name="Title 1">
-            <a:extLst>
-              <a:ext uri="{FF2B5EF4-FFF2-40B4-BE49-F238E27FC236}">
-                <a16:creationId xmlns:a16="http://schemas.microsoft.com/office/drawing/2014/main" id="{531BCA8B-151A-430F-BC3E-E7B113549A24}"/>
-              </a:ext>
-            </a:extLst>
-          </p:cNvPr>
-          <p:cNvSpPr>
-            <a:spLocks noGrp="1"/>
-          </p:cNvSpPr>
-          <p:nvPr>
-            <p:ph type="title"/>
-          </p:nvPr>
-        </p:nvSpPr>
-        <p:spPr/>
-        <p:txBody>
-          <a:bodyPr/>
-          <a:lstStyle/>
-          <a:p>
-            <a:r>
-              <a:rPr lang="en-US" dirty="0"/>
-              <a:t>Non-Functional Requirements</a:t>
-            </a:r>
-          </a:p>
-        </p:txBody>
-      </p:sp>
-      <p:sp>
-        <p:nvSpPr>
-          <p:cNvPr id="3" name="Content Placeholder 2">
-            <a:extLst>
-              <a:ext uri="{FF2B5EF4-FFF2-40B4-BE49-F238E27FC236}">
-                <a16:creationId xmlns:a16="http://schemas.microsoft.com/office/drawing/2014/main" id="{5A0260F5-7950-496C-B30E-A6945723C7F3}"/>
-              </a:ext>
-            </a:extLst>
-          </p:cNvPr>
-          <p:cNvSpPr>
-            <a:spLocks noGrp="1"/>
-          </p:cNvSpPr>
-          <p:nvPr>
-            <p:ph idx="1"/>
-          </p:nvPr>
-        </p:nvSpPr>
-        <p:spPr/>
-        <p:txBody>
-          <a:bodyPr>
-            <a:noAutofit/>
-          </a:bodyPr>
-          <a:lstStyle/>
-          <a:p>
-            <a:r>
-              <a:rPr lang="en-US" sz="3600" dirty="0"/>
-              <a:t>Import calendar/events from Google Calendar API</a:t>
-            </a:r>
-          </a:p>
-          <a:p>
-            <a:r>
-              <a:rPr lang="en-US" sz="3600" dirty="0"/>
-              <a:t>Display a schedule linearly – a timeline </a:t>
-            </a:r>
-          </a:p>
-          <a:p>
-            <a:r>
-              <a:rPr lang="en-US" sz="3600" dirty="0"/>
-              <a:t>Compare shared Timelines and provide visual feedback</a:t>
-            </a:r>
-          </a:p>
-          <a:p>
-            <a:r>
-              <a:rPr lang="en-US" sz="3600" dirty="0"/>
-              <a:t>Communicate with Database structure to pull/push user’s Timeline(s) and Event(s).</a:t>
-            </a:r>
-          </a:p>
-        </p:txBody>
-      </p:sp>
-    </p:spTree>
-    <p:extLst>
-      <p:ext uri="{BB962C8B-B14F-4D97-AF65-F5344CB8AC3E}">
-        <p14:creationId xmlns:p14="http://schemas.microsoft.com/office/powerpoint/2010/main" val="936759088"/>
-      </p:ext>
-    </p:extLst>
-  </p:cSld>
-  <p:clrMapOvr>
-    <a:masterClrMapping/>
-  </p:clrMapOvr>
-</p:sld>
-</file>
-
-<file path=ppt/slides/slide6.xml><?xml version="1.0" encoding="utf-8"?>
+<file path=ppt/slides/slide10.xml><?xml version="1.0" encoding="utf-8"?>
 <p:sld xmlns:a="http://schemas.openxmlformats.org/drawingml/2006/main" xmlns:r="http://schemas.openxmlformats.org/officeDocument/2006/relationships" xmlns:p="http://schemas.openxmlformats.org/presentationml/2006/main">
   <p:cSld>
     <p:spTree>
@@ -7716,7 +7224,956 @@
 </p:sld>
 </file>
 
+<file path=ppt/slides/slide11.xml><?xml version="1.0" encoding="utf-8"?>
+<p:sld xmlns:a="http://schemas.openxmlformats.org/drawingml/2006/main" xmlns:r="http://schemas.openxmlformats.org/officeDocument/2006/relationships" xmlns:p="http://schemas.openxmlformats.org/presentationml/2006/main">
+  <p:cSld>
+    <p:spTree>
+      <p:nvGrpSpPr>
+        <p:cNvPr id="1" name=""/>
+        <p:cNvGrpSpPr/>
+        <p:nvPr/>
+      </p:nvGrpSpPr>
+      <p:grpSpPr>
+        <a:xfrm>
+          <a:off x="0" y="0"/>
+          <a:ext cx="0" cy="0"/>
+          <a:chOff x="0" y="0"/>
+          <a:chExt cx="0" cy="0"/>
+        </a:xfrm>
+      </p:grpSpPr>
+      <p:sp>
+        <p:nvSpPr>
+          <p:cNvPr id="2" name="Title 1">
+            <a:extLst>
+              <a:ext uri="{FF2B5EF4-FFF2-40B4-BE49-F238E27FC236}">
+                <a16:creationId xmlns:a16="http://schemas.microsoft.com/office/drawing/2014/main" id="{7573D943-A65C-4992-9773-06DAFCBC3C6B}"/>
+              </a:ext>
+            </a:extLst>
+          </p:cNvPr>
+          <p:cNvSpPr>
+            <a:spLocks noGrp="1"/>
+          </p:cNvSpPr>
+          <p:nvPr>
+            <p:ph type="title"/>
+          </p:nvPr>
+        </p:nvSpPr>
+        <p:spPr>
+          <a:xfrm>
+            <a:off x="1412122" y="685801"/>
+            <a:ext cx="10018713" cy="974558"/>
+          </a:xfrm>
+        </p:spPr>
+        <p:txBody>
+          <a:bodyPr/>
+          <a:lstStyle/>
+          <a:p>
+            <a:r>
+              <a:rPr lang="en-US" dirty="0"/>
+              <a:t>Priorities</a:t>
+            </a:r>
+          </a:p>
+        </p:txBody>
+      </p:sp>
+      <p:sp>
+        <p:nvSpPr>
+          <p:cNvPr id="3" name="Content Placeholder 2">
+            <a:extLst>
+              <a:ext uri="{FF2B5EF4-FFF2-40B4-BE49-F238E27FC236}">
+                <a16:creationId xmlns:a16="http://schemas.microsoft.com/office/drawing/2014/main" id="{3A7B6C00-F980-4A99-B8D0-73CA2926052D}"/>
+              </a:ext>
+            </a:extLst>
+          </p:cNvPr>
+          <p:cNvSpPr>
+            <a:spLocks noGrp="1"/>
+          </p:cNvSpPr>
+          <p:nvPr>
+            <p:ph idx="1"/>
+          </p:nvPr>
+        </p:nvSpPr>
+        <p:spPr>
+          <a:xfrm>
+            <a:off x="1412122" y="1876927"/>
+            <a:ext cx="10779878" cy="3914274"/>
+          </a:xfrm>
+        </p:spPr>
+        <p:txBody>
+          <a:bodyPr>
+            <a:noAutofit/>
+          </a:bodyPr>
+          <a:lstStyle/>
+          <a:p>
+            <a:r>
+              <a:rPr lang="en-US" sz="3600" dirty="0"/>
+              <a:t>1. </a:t>
+            </a:r>
+            <a:r>
+              <a:rPr lang="en-US" sz="3600" b="1" dirty="0"/>
+              <a:t>Primary:</a:t>
+            </a:r>
+            <a:r>
+              <a:rPr lang="en-US" sz="3600" dirty="0"/>
+              <a:t>  Create, Populate, Share, Combine/Compare Timelines</a:t>
+            </a:r>
+          </a:p>
+          <a:p>
+            <a:r>
+              <a:rPr lang="en-US" sz="3600" dirty="0"/>
+              <a:t>2. </a:t>
+            </a:r>
+            <a:r>
+              <a:rPr lang="en-US" sz="3600" b="1" dirty="0"/>
+              <a:t>Possible: </a:t>
+            </a:r>
+            <a:r>
+              <a:rPr lang="en-US" sz="3600" dirty="0"/>
+              <a:t>Google Calendar API integration</a:t>
+            </a:r>
+          </a:p>
+          <a:p>
+            <a:r>
+              <a:rPr lang="en-US" sz="3600" dirty="0"/>
+              <a:t>3.  </a:t>
+            </a:r>
+            <a:r>
+              <a:rPr lang="en-US" sz="3600" b="1" dirty="0"/>
+              <a:t>Future if Time Allows: </a:t>
+            </a:r>
+            <a:r>
+              <a:rPr lang="en-US" sz="3600" dirty="0"/>
+              <a:t>Automated invitations and Group Management</a:t>
+            </a:r>
+          </a:p>
+        </p:txBody>
+      </p:sp>
+    </p:spTree>
+    <p:extLst>
+      <p:ext uri="{BB962C8B-B14F-4D97-AF65-F5344CB8AC3E}">
+        <p14:creationId xmlns:p14="http://schemas.microsoft.com/office/powerpoint/2010/main" val="27401101"/>
+      </p:ext>
+    </p:extLst>
+  </p:cSld>
+  <p:clrMapOvr>
+    <a:masterClrMapping/>
+  </p:clrMapOvr>
+</p:sld>
+</file>
+
+<file path=ppt/slides/slide12.xml><?xml version="1.0" encoding="utf-8"?>
+<p:sld xmlns:a="http://schemas.openxmlformats.org/drawingml/2006/main" xmlns:r="http://schemas.openxmlformats.org/officeDocument/2006/relationships" xmlns:p="http://schemas.openxmlformats.org/presentationml/2006/main">
+  <p:cSld>
+    <p:spTree>
+      <p:nvGrpSpPr>
+        <p:cNvPr id="1" name=""/>
+        <p:cNvGrpSpPr/>
+        <p:nvPr/>
+      </p:nvGrpSpPr>
+      <p:grpSpPr>
+        <a:xfrm>
+          <a:off x="0" y="0"/>
+          <a:ext cx="0" cy="0"/>
+          <a:chOff x="0" y="0"/>
+          <a:chExt cx="0" cy="0"/>
+        </a:xfrm>
+      </p:grpSpPr>
+      <p:sp>
+        <p:nvSpPr>
+          <p:cNvPr id="2" name="Title 1">
+            <a:extLst>
+              <a:ext uri="{FF2B5EF4-FFF2-40B4-BE49-F238E27FC236}">
+                <a16:creationId xmlns:a16="http://schemas.microsoft.com/office/drawing/2014/main" id="{B073C325-072D-44E6-AEA2-2C51A839C38A}"/>
+              </a:ext>
+            </a:extLst>
+          </p:cNvPr>
+          <p:cNvSpPr>
+            <a:spLocks noGrp="1"/>
+          </p:cNvSpPr>
+          <p:nvPr>
+            <p:ph type="title"/>
+          </p:nvPr>
+        </p:nvSpPr>
+        <p:spPr>
+          <a:xfrm>
+            <a:off x="1484310" y="0"/>
+            <a:ext cx="10018713" cy="782052"/>
+          </a:xfrm>
+        </p:spPr>
+        <p:txBody>
+          <a:bodyPr>
+            <a:normAutofit/>
+          </a:bodyPr>
+          <a:lstStyle/>
+          <a:p>
+            <a:r>
+              <a:rPr lang="en-US" dirty="0"/>
+              <a:t>Potential Risks	</a:t>
+            </a:r>
+          </a:p>
+        </p:txBody>
+      </p:sp>
+      <p:sp>
+        <p:nvSpPr>
+          <p:cNvPr id="3" name="Content Placeholder 2">
+            <a:extLst>
+              <a:ext uri="{FF2B5EF4-FFF2-40B4-BE49-F238E27FC236}">
+                <a16:creationId xmlns:a16="http://schemas.microsoft.com/office/drawing/2014/main" id="{7249D929-71A8-48AE-82B3-0B12E5F95C03}"/>
+              </a:ext>
+            </a:extLst>
+          </p:cNvPr>
+          <p:cNvSpPr>
+            <a:spLocks noGrp="1"/>
+          </p:cNvSpPr>
+          <p:nvPr>
+            <p:ph idx="1"/>
+          </p:nvPr>
+        </p:nvSpPr>
+        <p:spPr>
+          <a:xfrm>
+            <a:off x="1484311" y="1872915"/>
+            <a:ext cx="10018713" cy="3124201"/>
+          </a:xfrm>
+        </p:spPr>
+        <p:txBody>
+          <a:bodyPr>
+            <a:normAutofit/>
+          </a:bodyPr>
+          <a:lstStyle/>
+          <a:p>
+            <a:r>
+              <a:rPr lang="en-US" sz="3600" dirty="0"/>
+              <a:t>Improper database integration: Learning to implement Firebase could delay functionality in the short-term.</a:t>
+            </a:r>
+          </a:p>
+        </p:txBody>
+      </p:sp>
+    </p:spTree>
+    <p:extLst>
+      <p:ext uri="{BB962C8B-B14F-4D97-AF65-F5344CB8AC3E}">
+        <p14:creationId xmlns:p14="http://schemas.microsoft.com/office/powerpoint/2010/main" val="3663679173"/>
+      </p:ext>
+    </p:extLst>
+  </p:cSld>
+  <p:clrMapOvr>
+    <a:masterClrMapping/>
+  </p:clrMapOvr>
+</p:sld>
+</file>
+
+<file path=ppt/slides/slide2.xml><?xml version="1.0" encoding="utf-8"?>
+<p:sld xmlns:a="http://schemas.openxmlformats.org/drawingml/2006/main" xmlns:r="http://schemas.openxmlformats.org/officeDocument/2006/relationships" xmlns:p="http://schemas.openxmlformats.org/presentationml/2006/main">
+  <p:cSld>
+    <p:spTree>
+      <p:nvGrpSpPr>
+        <p:cNvPr id="1" name=""/>
+        <p:cNvGrpSpPr/>
+        <p:nvPr/>
+      </p:nvGrpSpPr>
+      <p:grpSpPr>
+        <a:xfrm>
+          <a:off x="0" y="0"/>
+          <a:ext cx="0" cy="0"/>
+          <a:chOff x="0" y="0"/>
+          <a:chExt cx="0" cy="0"/>
+        </a:xfrm>
+      </p:grpSpPr>
+      <p:sp>
+        <p:nvSpPr>
+          <p:cNvPr id="2" name="Title 1">
+            <a:extLst>
+              <a:ext uri="{FF2B5EF4-FFF2-40B4-BE49-F238E27FC236}">
+                <a16:creationId xmlns:a16="http://schemas.microsoft.com/office/drawing/2014/main" id="{E015D09F-E483-4412-8F5B-2210854CBE49}"/>
+              </a:ext>
+            </a:extLst>
+          </p:cNvPr>
+          <p:cNvSpPr>
+            <a:spLocks noGrp="1"/>
+          </p:cNvSpPr>
+          <p:nvPr>
+            <p:ph type="title"/>
+          </p:nvPr>
+        </p:nvSpPr>
+        <p:spPr/>
+        <p:txBody>
+          <a:bodyPr/>
+          <a:lstStyle/>
+          <a:p>
+            <a:r>
+              <a:rPr lang="en-US" dirty="0"/>
+              <a:t>Topics	</a:t>
+            </a:r>
+          </a:p>
+        </p:txBody>
+      </p:sp>
+      <p:sp>
+        <p:nvSpPr>
+          <p:cNvPr id="5" name="TextBox 4">
+            <a:extLst>
+              <a:ext uri="{FF2B5EF4-FFF2-40B4-BE49-F238E27FC236}">
+                <a16:creationId xmlns:a16="http://schemas.microsoft.com/office/drawing/2014/main" id="{B8417A24-9A87-4A1A-B0CB-B2750AEC5A19}"/>
+              </a:ext>
+            </a:extLst>
+          </p:cNvPr>
+          <p:cNvSpPr txBox="1"/>
+          <p:nvPr/>
+        </p:nvSpPr>
+        <p:spPr>
+          <a:xfrm>
+            <a:off x="1804737" y="2237874"/>
+            <a:ext cx="9432758" cy="3416320"/>
+          </a:xfrm>
+          <a:prstGeom prst="rect">
+            <a:avLst/>
+          </a:prstGeom>
+          <a:noFill/>
+        </p:spPr>
+        <p:txBody>
+          <a:bodyPr wrap="square" rtlCol="0">
+            <a:spAutoFit/>
+          </a:bodyPr>
+          <a:lstStyle/>
+          <a:p>
+            <a:pPr marL="285750" indent="-285750">
+              <a:buFont typeface="Arial" panose="020B0604020202020204" pitchFamily="34" charset="0"/>
+              <a:buChar char="•"/>
+            </a:pPr>
+            <a:r>
+              <a:rPr lang="en-US" sz="3600" dirty="0"/>
+              <a:t>Project Description</a:t>
+            </a:r>
+          </a:p>
+          <a:p>
+            <a:pPr marL="285750" indent="-285750">
+              <a:buFont typeface="Arial" panose="020B0604020202020204" pitchFamily="34" charset="0"/>
+              <a:buChar char="•"/>
+            </a:pPr>
+            <a:r>
+              <a:rPr lang="en-US" sz="3600" dirty="0"/>
+              <a:t>Requirements </a:t>
+            </a:r>
+          </a:p>
+          <a:p>
+            <a:pPr marL="800100" lvl="1" indent="-342900">
+              <a:buFont typeface="Arial" panose="020B0604020202020204" pitchFamily="34" charset="0"/>
+              <a:buChar char="•"/>
+            </a:pPr>
+            <a:r>
+              <a:rPr lang="en-US" sz="3600" dirty="0"/>
+              <a:t>Functional</a:t>
+            </a:r>
+          </a:p>
+          <a:p>
+            <a:pPr marL="800100" lvl="1" indent="-342900">
+              <a:buFont typeface="Arial" panose="020B0604020202020204" pitchFamily="34" charset="0"/>
+              <a:buChar char="•"/>
+            </a:pPr>
+            <a:r>
+              <a:rPr lang="en-US" sz="3600" dirty="0"/>
+              <a:t>Non-Functional</a:t>
+            </a:r>
+          </a:p>
+          <a:p>
+            <a:pPr marL="342900" indent="-342900">
+              <a:buFont typeface="Arial" panose="020B0604020202020204" pitchFamily="34" charset="0"/>
+              <a:buChar char="•"/>
+            </a:pPr>
+            <a:r>
+              <a:rPr lang="en-US" sz="3600" dirty="0"/>
+              <a:t>Competitors Table</a:t>
+            </a:r>
+          </a:p>
+          <a:p>
+            <a:pPr marL="342900" indent="-342900">
+              <a:buFont typeface="Arial" panose="020B0604020202020204" pitchFamily="34" charset="0"/>
+              <a:buChar char="•"/>
+            </a:pPr>
+            <a:r>
+              <a:rPr lang="en-US" sz="3600" dirty="0"/>
+              <a:t>Diagrams / Images</a:t>
+            </a:r>
+          </a:p>
+        </p:txBody>
+      </p:sp>
+    </p:spTree>
+    <p:extLst>
+      <p:ext uri="{BB962C8B-B14F-4D97-AF65-F5344CB8AC3E}">
+        <p14:creationId xmlns:p14="http://schemas.microsoft.com/office/powerpoint/2010/main" val="1956034634"/>
+      </p:ext>
+    </p:extLst>
+  </p:cSld>
+  <p:clrMapOvr>
+    <a:masterClrMapping/>
+  </p:clrMapOvr>
+</p:sld>
+</file>
+
+<file path=ppt/slides/slide3.xml><?xml version="1.0" encoding="utf-8"?>
+<p:sld xmlns:a="http://schemas.openxmlformats.org/drawingml/2006/main" xmlns:r="http://schemas.openxmlformats.org/officeDocument/2006/relationships" xmlns:p="http://schemas.openxmlformats.org/presentationml/2006/main">
+  <p:cSld>
+    <p:spTree>
+      <p:nvGrpSpPr>
+        <p:cNvPr id="1" name=""/>
+        <p:cNvGrpSpPr/>
+        <p:nvPr/>
+      </p:nvGrpSpPr>
+      <p:grpSpPr>
+        <a:xfrm>
+          <a:off x="0" y="0"/>
+          <a:ext cx="0" cy="0"/>
+          <a:chOff x="0" y="0"/>
+          <a:chExt cx="0" cy="0"/>
+        </a:xfrm>
+      </p:grpSpPr>
+      <p:sp>
+        <p:nvSpPr>
+          <p:cNvPr id="2" name="Title 1">
+            <a:extLst>
+              <a:ext uri="{FF2B5EF4-FFF2-40B4-BE49-F238E27FC236}">
+                <a16:creationId xmlns:a16="http://schemas.microsoft.com/office/drawing/2014/main" id="{4E8BCD19-4730-4865-A857-A2B3D5C08CF0}"/>
+              </a:ext>
+            </a:extLst>
+          </p:cNvPr>
+          <p:cNvSpPr>
+            <a:spLocks noGrp="1"/>
+          </p:cNvSpPr>
+          <p:nvPr>
+            <p:ph type="title"/>
+          </p:nvPr>
+        </p:nvSpPr>
+        <p:spPr/>
+        <p:txBody>
+          <a:bodyPr/>
+          <a:lstStyle/>
+          <a:p>
+            <a:r>
+              <a:rPr lang="en-US" dirty="0"/>
+              <a:t>Problem</a:t>
+            </a:r>
+          </a:p>
+        </p:txBody>
+      </p:sp>
+      <p:sp>
+        <p:nvSpPr>
+          <p:cNvPr id="3" name="Content Placeholder 2">
+            <a:extLst>
+              <a:ext uri="{FF2B5EF4-FFF2-40B4-BE49-F238E27FC236}">
+                <a16:creationId xmlns:a16="http://schemas.microsoft.com/office/drawing/2014/main" id="{0BF8E577-8C0C-4C4C-B83F-0E893BD2CD54}"/>
+              </a:ext>
+            </a:extLst>
+          </p:cNvPr>
+          <p:cNvSpPr>
+            <a:spLocks noGrp="1"/>
+          </p:cNvSpPr>
+          <p:nvPr>
+            <p:ph idx="1"/>
+          </p:nvPr>
+        </p:nvSpPr>
+        <p:spPr/>
+        <p:txBody>
+          <a:bodyPr>
+            <a:normAutofit/>
+          </a:bodyPr>
+          <a:lstStyle/>
+          <a:p>
+            <a:r>
+              <a:rPr lang="en-US" sz="3600" dirty="0"/>
+              <a:t>Current calendar and messaging apps lack the ability to quickly, easily compare schedules in order to plan for future events involving numerous participants. </a:t>
+            </a:r>
+          </a:p>
+          <a:p>
+            <a:r>
+              <a:rPr lang="en-US" sz="3600" dirty="0"/>
+              <a:t>E.g. project group meeting times</a:t>
+            </a:r>
+          </a:p>
+        </p:txBody>
+      </p:sp>
+    </p:spTree>
+    <p:extLst>
+      <p:ext uri="{BB962C8B-B14F-4D97-AF65-F5344CB8AC3E}">
+        <p14:creationId xmlns:p14="http://schemas.microsoft.com/office/powerpoint/2010/main" val="1262479927"/>
+      </p:ext>
+    </p:extLst>
+  </p:cSld>
+  <p:clrMapOvr>
+    <a:masterClrMapping/>
+  </p:clrMapOvr>
+</p:sld>
+</file>
+
+<file path=ppt/slides/slide4.xml><?xml version="1.0" encoding="utf-8"?>
+<p:sld xmlns:a="http://schemas.openxmlformats.org/drawingml/2006/main" xmlns:r="http://schemas.openxmlformats.org/officeDocument/2006/relationships" xmlns:p="http://schemas.openxmlformats.org/presentationml/2006/main">
+  <p:cSld>
+    <p:spTree>
+      <p:nvGrpSpPr>
+        <p:cNvPr id="1" name=""/>
+        <p:cNvGrpSpPr/>
+        <p:nvPr/>
+      </p:nvGrpSpPr>
+      <p:grpSpPr>
+        <a:xfrm>
+          <a:off x="0" y="0"/>
+          <a:ext cx="0" cy="0"/>
+          <a:chOff x="0" y="0"/>
+          <a:chExt cx="0" cy="0"/>
+        </a:xfrm>
+      </p:grpSpPr>
+      <p:sp>
+        <p:nvSpPr>
+          <p:cNvPr id="2" name="Title 1">
+            <a:extLst>
+              <a:ext uri="{FF2B5EF4-FFF2-40B4-BE49-F238E27FC236}">
+                <a16:creationId xmlns:a16="http://schemas.microsoft.com/office/drawing/2014/main" id="{3848E86A-FF2F-44F8-AED8-3F0705EBFCC2}"/>
+              </a:ext>
+            </a:extLst>
+          </p:cNvPr>
+          <p:cNvSpPr>
+            <a:spLocks noGrp="1"/>
+          </p:cNvSpPr>
+          <p:nvPr>
+            <p:ph type="title"/>
+          </p:nvPr>
+        </p:nvSpPr>
+        <p:spPr/>
+        <p:txBody>
+          <a:bodyPr/>
+          <a:lstStyle/>
+          <a:p>
+            <a:r>
+              <a:rPr lang="en-US" dirty="0"/>
+              <a:t>Solution</a:t>
+            </a:r>
+          </a:p>
+        </p:txBody>
+      </p:sp>
+      <p:sp>
+        <p:nvSpPr>
+          <p:cNvPr id="3" name="Content Placeholder 2">
+            <a:extLst>
+              <a:ext uri="{FF2B5EF4-FFF2-40B4-BE49-F238E27FC236}">
+                <a16:creationId xmlns:a16="http://schemas.microsoft.com/office/drawing/2014/main" id="{C586D993-8945-402D-AC08-59B2A710DE88}"/>
+              </a:ext>
+            </a:extLst>
+          </p:cNvPr>
+          <p:cNvSpPr>
+            <a:spLocks noGrp="1"/>
+          </p:cNvSpPr>
+          <p:nvPr>
+            <p:ph idx="1"/>
+          </p:nvPr>
+        </p:nvSpPr>
+        <p:spPr/>
+        <p:txBody>
+          <a:bodyPr>
+            <a:noAutofit/>
+          </a:bodyPr>
+          <a:lstStyle/>
+          <a:p>
+            <a:r>
+              <a:rPr lang="en-US" sz="3600" dirty="0"/>
+              <a:t>A personal schedule application that contains conventional methods for creating, viewing, and manipulating schedules, with the added functionalities of sharing and comparing schedules. </a:t>
+            </a:r>
+          </a:p>
+          <a:p>
+            <a:r>
+              <a:rPr lang="en-US" sz="3600" dirty="0"/>
+              <a:t>Schedules will be generated as a “Timeline”, which emphasizes a linear time progression. </a:t>
+            </a:r>
+          </a:p>
+        </p:txBody>
+      </p:sp>
+    </p:spTree>
+    <p:extLst>
+      <p:ext uri="{BB962C8B-B14F-4D97-AF65-F5344CB8AC3E}">
+        <p14:creationId xmlns:p14="http://schemas.microsoft.com/office/powerpoint/2010/main" val="903871358"/>
+      </p:ext>
+    </p:extLst>
+  </p:cSld>
+  <p:clrMapOvr>
+    <a:masterClrMapping/>
+  </p:clrMapOvr>
+</p:sld>
+</file>
+
+<file path=ppt/slides/slide5.xml><?xml version="1.0" encoding="utf-8"?>
+<p:sld xmlns:a="http://schemas.openxmlformats.org/drawingml/2006/main" xmlns:r="http://schemas.openxmlformats.org/officeDocument/2006/relationships" xmlns:p="http://schemas.openxmlformats.org/presentationml/2006/main">
+  <p:cSld>
+    <p:spTree>
+      <p:nvGrpSpPr>
+        <p:cNvPr id="1" name=""/>
+        <p:cNvGrpSpPr/>
+        <p:nvPr/>
+      </p:nvGrpSpPr>
+      <p:grpSpPr>
+        <a:xfrm>
+          <a:off x="0" y="0"/>
+          <a:ext cx="0" cy="0"/>
+          <a:chOff x="0" y="0"/>
+          <a:chExt cx="0" cy="0"/>
+        </a:xfrm>
+      </p:grpSpPr>
+      <p:sp>
+        <p:nvSpPr>
+          <p:cNvPr id="2" name="Title 1">
+            <a:extLst>
+              <a:ext uri="{FF2B5EF4-FFF2-40B4-BE49-F238E27FC236}">
+                <a16:creationId xmlns:a16="http://schemas.microsoft.com/office/drawing/2014/main" id="{13E21B5D-3ABB-4C81-B400-42E2ED3A5380}"/>
+              </a:ext>
+            </a:extLst>
+          </p:cNvPr>
+          <p:cNvSpPr>
+            <a:spLocks noGrp="1"/>
+          </p:cNvSpPr>
+          <p:nvPr>
+            <p:ph type="title"/>
+          </p:nvPr>
+        </p:nvSpPr>
+        <p:spPr>
+          <a:xfrm>
+            <a:off x="1484310" y="0"/>
+            <a:ext cx="10018713" cy="1118937"/>
+          </a:xfrm>
+        </p:spPr>
+        <p:txBody>
+          <a:bodyPr/>
+          <a:lstStyle/>
+          <a:p>
+            <a:r>
+              <a:rPr lang="en-US" dirty="0"/>
+              <a:t>Project Description</a:t>
+            </a:r>
+          </a:p>
+        </p:txBody>
+      </p:sp>
+      <p:sp>
+        <p:nvSpPr>
+          <p:cNvPr id="3" name="Content Placeholder 2">
+            <a:extLst>
+              <a:ext uri="{FF2B5EF4-FFF2-40B4-BE49-F238E27FC236}">
+                <a16:creationId xmlns:a16="http://schemas.microsoft.com/office/drawing/2014/main" id="{EB93E076-6805-4EAF-A0A5-8B50CAAA9E43}"/>
+              </a:ext>
+            </a:extLst>
+          </p:cNvPr>
+          <p:cNvSpPr>
+            <a:spLocks noGrp="1"/>
+          </p:cNvSpPr>
+          <p:nvPr>
+            <p:ph idx="1"/>
+          </p:nvPr>
+        </p:nvSpPr>
+        <p:spPr>
+          <a:xfrm>
+            <a:off x="1484311" y="2137610"/>
+            <a:ext cx="10018713" cy="3926306"/>
+          </a:xfrm>
+        </p:spPr>
+        <p:txBody>
+          <a:bodyPr>
+            <a:noAutofit/>
+          </a:bodyPr>
+          <a:lstStyle/>
+          <a:p>
+            <a:r>
+              <a:rPr lang="en-US" sz="3200" dirty="0"/>
+              <a:t>Time visualization</a:t>
+            </a:r>
+          </a:p>
+          <a:p>
+            <a:pPr lvl="1"/>
+            <a:r>
+              <a:rPr lang="en-US" sz="3200" dirty="0"/>
+              <a:t>See time linearly, instead of as a grid. </a:t>
+            </a:r>
+          </a:p>
+          <a:p>
+            <a:r>
+              <a:rPr lang="en-US" sz="3200" dirty="0"/>
+              <a:t>Time management</a:t>
+            </a:r>
+          </a:p>
+          <a:p>
+            <a:pPr lvl="1"/>
+            <a:r>
+              <a:rPr lang="en-US" sz="3200" dirty="0"/>
+              <a:t>Create events like any other scheduling app</a:t>
+            </a:r>
+          </a:p>
+          <a:p>
+            <a:pPr lvl="1"/>
+            <a:r>
+              <a:rPr lang="en-US" sz="3200" dirty="0"/>
+              <a:t>Share timeline</a:t>
+            </a:r>
+          </a:p>
+          <a:p>
+            <a:pPr lvl="1"/>
+            <a:r>
+              <a:rPr lang="en-US" sz="3200" dirty="0"/>
+              <a:t>Combine timelines </a:t>
+            </a:r>
+          </a:p>
+          <a:p>
+            <a:pPr lvl="1"/>
+            <a:r>
+              <a:rPr lang="en-US" sz="3200" dirty="0"/>
+              <a:t>Automatically analyze combined timelines to see conflicts or shared free-time</a:t>
+            </a:r>
+          </a:p>
+        </p:txBody>
+      </p:sp>
+    </p:spTree>
+    <p:extLst>
+      <p:ext uri="{BB962C8B-B14F-4D97-AF65-F5344CB8AC3E}">
+        <p14:creationId xmlns:p14="http://schemas.microsoft.com/office/powerpoint/2010/main" val="3606233267"/>
+      </p:ext>
+    </p:extLst>
+  </p:cSld>
+  <p:clrMapOvr>
+    <a:masterClrMapping/>
+  </p:clrMapOvr>
+</p:sld>
+</file>
+
+<file path=ppt/slides/slide6.xml><?xml version="1.0" encoding="utf-8"?>
+<p:sld xmlns:a="http://schemas.openxmlformats.org/drawingml/2006/main" xmlns:r="http://schemas.openxmlformats.org/officeDocument/2006/relationships" xmlns:p="http://schemas.openxmlformats.org/presentationml/2006/main">
+  <p:cSld>
+    <p:spTree>
+      <p:nvGrpSpPr>
+        <p:cNvPr id="1" name=""/>
+        <p:cNvGrpSpPr/>
+        <p:nvPr/>
+      </p:nvGrpSpPr>
+      <p:grpSpPr>
+        <a:xfrm>
+          <a:off x="0" y="0"/>
+          <a:ext cx="0" cy="0"/>
+          <a:chOff x="0" y="0"/>
+          <a:chExt cx="0" cy="0"/>
+        </a:xfrm>
+      </p:grpSpPr>
+      <p:sp>
+        <p:nvSpPr>
+          <p:cNvPr id="2" name="Title 1">
+            <a:extLst>
+              <a:ext uri="{FF2B5EF4-FFF2-40B4-BE49-F238E27FC236}">
+                <a16:creationId xmlns:a16="http://schemas.microsoft.com/office/drawing/2014/main" id="{8941213E-73E3-4E55-93C8-996A6C3D9E26}"/>
+              </a:ext>
+            </a:extLst>
+          </p:cNvPr>
+          <p:cNvSpPr>
+            <a:spLocks noGrp="1"/>
+          </p:cNvSpPr>
+          <p:nvPr>
+            <p:ph type="title"/>
+          </p:nvPr>
+        </p:nvSpPr>
+        <p:spPr>
+          <a:xfrm>
+            <a:off x="1484309" y="0"/>
+            <a:ext cx="10018713" cy="938463"/>
+          </a:xfrm>
+        </p:spPr>
+        <p:txBody>
+          <a:bodyPr/>
+          <a:lstStyle/>
+          <a:p>
+            <a:r>
+              <a:rPr lang="en-US" dirty="0"/>
+              <a:t>Functional Requirements</a:t>
+            </a:r>
+          </a:p>
+        </p:txBody>
+      </p:sp>
+      <p:sp>
+        <p:nvSpPr>
+          <p:cNvPr id="3" name="Content Placeholder 2">
+            <a:extLst>
+              <a:ext uri="{FF2B5EF4-FFF2-40B4-BE49-F238E27FC236}">
+                <a16:creationId xmlns:a16="http://schemas.microsoft.com/office/drawing/2014/main" id="{8AFBBA2B-A3FE-4C31-86F8-3B32EFA4BB73}"/>
+              </a:ext>
+            </a:extLst>
+          </p:cNvPr>
+          <p:cNvSpPr>
+            <a:spLocks noGrp="1"/>
+          </p:cNvSpPr>
+          <p:nvPr>
+            <p:ph idx="1"/>
+          </p:nvPr>
+        </p:nvSpPr>
+        <p:spPr>
+          <a:xfrm>
+            <a:off x="1484309" y="2041357"/>
+            <a:ext cx="10018713" cy="3124201"/>
+          </a:xfrm>
+        </p:spPr>
+        <p:txBody>
+          <a:bodyPr>
+            <a:noAutofit/>
+          </a:bodyPr>
+          <a:lstStyle/>
+          <a:p>
+            <a:r>
+              <a:rPr lang="en-US" sz="3600" dirty="0"/>
+              <a:t>Create a Timeline</a:t>
+            </a:r>
+          </a:p>
+          <a:p>
+            <a:r>
+              <a:rPr lang="en-US" sz="3600" dirty="0"/>
+              <a:t>Create/Add Events</a:t>
+            </a:r>
+          </a:p>
+          <a:p>
+            <a:r>
+              <a:rPr lang="en-US" sz="3600" dirty="0"/>
+              <a:t>Simple Queries of Timeline</a:t>
+            </a:r>
+          </a:p>
+          <a:p>
+            <a:r>
+              <a:rPr lang="en-US" sz="3600" dirty="0"/>
+              <a:t>Share Timeline </a:t>
+            </a:r>
+          </a:p>
+          <a:p>
+            <a:r>
+              <a:rPr lang="en-US" sz="3600" dirty="0"/>
+              <a:t>Combine and Compare Timelines</a:t>
+            </a:r>
+          </a:p>
+        </p:txBody>
+      </p:sp>
+    </p:spTree>
+    <p:extLst>
+      <p:ext uri="{BB962C8B-B14F-4D97-AF65-F5344CB8AC3E}">
+        <p14:creationId xmlns:p14="http://schemas.microsoft.com/office/powerpoint/2010/main" val="4179094161"/>
+      </p:ext>
+    </p:extLst>
+  </p:cSld>
+  <p:clrMapOvr>
+    <a:masterClrMapping/>
+  </p:clrMapOvr>
+</p:sld>
+</file>
+
 <file path=ppt/slides/slide7.xml><?xml version="1.0" encoding="utf-8"?>
+<p:sld xmlns:a="http://schemas.openxmlformats.org/drawingml/2006/main" xmlns:r="http://schemas.openxmlformats.org/officeDocument/2006/relationships" xmlns:p="http://schemas.openxmlformats.org/presentationml/2006/main">
+  <p:cSld>
+    <p:spTree>
+      <p:nvGrpSpPr>
+        <p:cNvPr id="1" name=""/>
+        <p:cNvGrpSpPr/>
+        <p:nvPr/>
+      </p:nvGrpSpPr>
+      <p:grpSpPr>
+        <a:xfrm>
+          <a:off x="0" y="0"/>
+          <a:ext cx="0" cy="0"/>
+          <a:chOff x="0" y="0"/>
+          <a:chExt cx="0" cy="0"/>
+        </a:xfrm>
+      </p:grpSpPr>
+      <p:sp>
+        <p:nvSpPr>
+          <p:cNvPr id="2" name="Title 1">
+            <a:extLst>
+              <a:ext uri="{FF2B5EF4-FFF2-40B4-BE49-F238E27FC236}">
+                <a16:creationId xmlns:a16="http://schemas.microsoft.com/office/drawing/2014/main" id="{531BCA8B-151A-430F-BC3E-E7B113549A24}"/>
+              </a:ext>
+            </a:extLst>
+          </p:cNvPr>
+          <p:cNvSpPr>
+            <a:spLocks noGrp="1"/>
+          </p:cNvSpPr>
+          <p:nvPr>
+            <p:ph type="title"/>
+          </p:nvPr>
+        </p:nvSpPr>
+        <p:spPr>
+          <a:xfrm>
+            <a:off x="1484309" y="1"/>
+            <a:ext cx="10018713" cy="1155032"/>
+          </a:xfrm>
+        </p:spPr>
+        <p:txBody>
+          <a:bodyPr/>
+          <a:lstStyle/>
+          <a:p>
+            <a:r>
+              <a:rPr lang="en-US" dirty="0"/>
+              <a:t>Non-Functional Requirements</a:t>
+            </a:r>
+          </a:p>
+        </p:txBody>
+      </p:sp>
+      <p:sp>
+        <p:nvSpPr>
+          <p:cNvPr id="3" name="Content Placeholder 2">
+            <a:extLst>
+              <a:ext uri="{FF2B5EF4-FFF2-40B4-BE49-F238E27FC236}">
+                <a16:creationId xmlns:a16="http://schemas.microsoft.com/office/drawing/2014/main" id="{5A0260F5-7950-496C-B30E-A6945723C7F3}"/>
+              </a:ext>
+            </a:extLst>
+          </p:cNvPr>
+          <p:cNvSpPr>
+            <a:spLocks noGrp="1"/>
+          </p:cNvSpPr>
+          <p:nvPr>
+            <p:ph idx="1"/>
+          </p:nvPr>
+        </p:nvSpPr>
+        <p:spPr>
+          <a:xfrm>
+            <a:off x="1484309" y="2787314"/>
+            <a:ext cx="10018713" cy="3124201"/>
+          </a:xfrm>
+        </p:spPr>
+        <p:txBody>
+          <a:bodyPr>
+            <a:noAutofit/>
+          </a:bodyPr>
+          <a:lstStyle/>
+          <a:p>
+            <a:r>
+              <a:rPr lang="en-US" sz="3600" dirty="0"/>
+              <a:t>Display a schedule linearly – a timeline </a:t>
+            </a:r>
+          </a:p>
+          <a:p>
+            <a:r>
+              <a:rPr lang="en-US" sz="3600" dirty="0"/>
+              <a:t>Compare shared Timelines and provide visual feedback</a:t>
+            </a:r>
+          </a:p>
+          <a:p>
+            <a:r>
+              <a:rPr lang="en-US" sz="3600" dirty="0"/>
+              <a:t>Communicate with Database structure to pull/push user’s Timeline(s) and Event(s).</a:t>
+            </a:r>
+          </a:p>
+          <a:p>
+            <a:r>
+              <a:rPr lang="en-US" sz="3600" dirty="0"/>
+              <a:t>Import calendar/events from Google Calendar API</a:t>
+            </a:r>
+          </a:p>
+          <a:p>
+            <a:endParaRPr lang="en-US" sz="3600" dirty="0"/>
+          </a:p>
+        </p:txBody>
+      </p:sp>
+    </p:spTree>
+    <p:extLst>
+      <p:ext uri="{BB962C8B-B14F-4D97-AF65-F5344CB8AC3E}">
+        <p14:creationId xmlns:p14="http://schemas.microsoft.com/office/powerpoint/2010/main" val="936759088"/>
+      </p:ext>
+    </p:extLst>
+  </p:cSld>
+  <p:clrMapOvr>
+    <a:masterClrMapping/>
+  </p:clrMapOvr>
+</p:sld>
+</file>
+
+<file path=ppt/slides/slide8.xml><?xml version="1.0" encoding="utf-8"?>
 <p:sld xmlns:a="http://schemas.openxmlformats.org/drawingml/2006/main" xmlns:r="http://schemas.openxmlformats.org/officeDocument/2006/relationships" xmlns:p="http://schemas.openxmlformats.org/presentationml/2006/main">
   <p:cSld>
     <p:spTree>
@@ -7735,19 +8192,17 @@
       </p:grpSpPr>
       <p:pic>
         <p:nvPicPr>
-          <p:cNvPr id="5" name="Content Placeholder 4">
+          <p:cNvPr id="6" name="Picture 5">
             <a:extLst>
               <a:ext uri="{FF2B5EF4-FFF2-40B4-BE49-F238E27FC236}">
-                <a16:creationId xmlns:a16="http://schemas.microsoft.com/office/drawing/2014/main" id="{3919FE8A-AF2C-4263-A14F-16704A29028C}"/>
+                <a16:creationId xmlns:a16="http://schemas.microsoft.com/office/drawing/2014/main" id="{244027EB-856B-4646-99AA-A71296D49491}"/>
               </a:ext>
             </a:extLst>
           </p:cNvPr>
           <p:cNvPicPr>
-            <a:picLocks noGrp="1" noChangeAspect="1"/>
+            <a:picLocks noChangeAspect="1"/>
           </p:cNvPicPr>
-          <p:nvPr>
-            <p:ph idx="1"/>
-          </p:nvPr>
+          <p:nvPr/>
         </p:nvPicPr>
         <p:blipFill>
           <a:blip r:embed="rId2">
@@ -7763,15 +8218,117 @@
         </p:blipFill>
         <p:spPr>
           <a:xfrm>
-            <a:off x="2502567" y="1"/>
-            <a:ext cx="8277727" cy="6858000"/>
+            <a:off x="3537284" y="37943"/>
+            <a:ext cx="8422105" cy="6820058"/>
           </a:xfrm>
+          <a:prstGeom prst="rect">
+            <a:avLst/>
+          </a:prstGeom>
         </p:spPr>
       </p:pic>
     </p:spTree>
     <p:extLst>
       <p:ext uri="{BB962C8B-B14F-4D97-AF65-F5344CB8AC3E}">
         <p14:creationId xmlns:p14="http://schemas.microsoft.com/office/powerpoint/2010/main" val="3506506140"/>
+      </p:ext>
+    </p:extLst>
+  </p:cSld>
+  <p:clrMapOvr>
+    <a:masterClrMapping/>
+  </p:clrMapOvr>
+</p:sld>
+</file>
+
+<file path=ppt/slides/slide9.xml><?xml version="1.0" encoding="utf-8"?>
+<p:sld xmlns:a="http://schemas.openxmlformats.org/drawingml/2006/main" xmlns:r="http://schemas.openxmlformats.org/officeDocument/2006/relationships" xmlns:p="http://schemas.openxmlformats.org/presentationml/2006/main">
+  <p:cSld>
+    <p:spTree>
+      <p:nvGrpSpPr>
+        <p:cNvPr id="1" name=""/>
+        <p:cNvGrpSpPr/>
+        <p:nvPr/>
+      </p:nvGrpSpPr>
+      <p:grpSpPr>
+        <a:xfrm>
+          <a:off x="0" y="0"/>
+          <a:ext cx="0" cy="0"/>
+          <a:chOff x="0" y="0"/>
+          <a:chExt cx="0" cy="0"/>
+        </a:xfrm>
+      </p:grpSpPr>
+      <p:sp>
+        <p:nvSpPr>
+          <p:cNvPr id="2" name="Title 1">
+            <a:extLst>
+              <a:ext uri="{FF2B5EF4-FFF2-40B4-BE49-F238E27FC236}">
+                <a16:creationId xmlns:a16="http://schemas.microsoft.com/office/drawing/2014/main" id="{43013237-7759-4DA1-8C41-3A2060E4EEF5}"/>
+              </a:ext>
+            </a:extLst>
+          </p:cNvPr>
+          <p:cNvSpPr>
+            <a:spLocks noGrp="1"/>
+          </p:cNvSpPr>
+          <p:nvPr>
+            <p:ph type="title"/>
+          </p:nvPr>
+        </p:nvSpPr>
+        <p:spPr>
+          <a:xfrm>
+            <a:off x="1484310" y="0"/>
+            <a:ext cx="10018713" cy="709863"/>
+          </a:xfrm>
+        </p:spPr>
+        <p:txBody>
+          <a:bodyPr/>
+          <a:lstStyle/>
+          <a:p>
+            <a:r>
+              <a:rPr lang="en-US" dirty="0"/>
+              <a:t>Class Diagram</a:t>
+            </a:r>
+          </a:p>
+        </p:txBody>
+      </p:sp>
+      <p:pic>
+        <p:nvPicPr>
+          <p:cNvPr id="5" name="Picture 4">
+            <a:extLst>
+              <a:ext uri="{FF2B5EF4-FFF2-40B4-BE49-F238E27FC236}">
+                <a16:creationId xmlns:a16="http://schemas.microsoft.com/office/drawing/2014/main" id="{8A5916E6-B52A-42FB-A154-C9D8966915CE}"/>
+              </a:ext>
+            </a:extLst>
+          </p:cNvPr>
+          <p:cNvPicPr>
+            <a:picLocks noChangeAspect="1"/>
+          </p:cNvPicPr>
+          <p:nvPr/>
+        </p:nvPicPr>
+        <p:blipFill>
+          <a:blip r:embed="rId2">
+            <a:extLst>
+              <a:ext uri="{28A0092B-C50C-407E-A947-70E740481C1C}">
+                <a14:useLocalDpi xmlns:a14="http://schemas.microsoft.com/office/drawing/2010/main" val="0"/>
+              </a:ext>
+            </a:extLst>
+          </a:blip>
+          <a:stretch>
+            <a:fillRect/>
+          </a:stretch>
+        </p:blipFill>
+        <p:spPr>
+          <a:xfrm>
+            <a:off x="148110" y="0"/>
+            <a:ext cx="11895780" cy="6858000"/>
+          </a:xfrm>
+          <a:prstGeom prst="rect">
+            <a:avLst/>
+          </a:prstGeom>
+        </p:spPr>
+      </p:pic>
+    </p:spTree>
+    <p:extLst>
+      <p:ext uri="{BB962C8B-B14F-4D97-AF65-F5344CB8AC3E}">
+        <p14:creationId xmlns:p14="http://schemas.microsoft.com/office/powerpoint/2010/main" val="2190383665"/>
       </p:ext>
     </p:extLst>
   </p:cSld>

</xml_diff>

<commit_message>
Presentation Update, UML diagrams added
</commit_message>
<xml_diff>
--- a/presentation/Requirements_TimelineGroup.pptx
+++ b/presentation/Requirements_TimelineGroup.pptx
@@ -7032,31 +7032,41 @@
           </a:p>
         </p:txBody>
       </p:sp>
-      <p:sp>
-        <p:nvSpPr>
-          <p:cNvPr id="3" name="Content Placeholder 2">
+      <p:pic>
+        <p:nvPicPr>
+          <p:cNvPr id="5" name="Content Placeholder 4">
             <a:extLst>
               <a:ext uri="{FF2B5EF4-FFF2-40B4-BE49-F238E27FC236}">
-                <a16:creationId xmlns:a16="http://schemas.microsoft.com/office/drawing/2014/main" id="{D02A756A-6F7C-477F-8A2E-069DC8FF50FE}"/>
+                <a16:creationId xmlns:a16="http://schemas.microsoft.com/office/drawing/2014/main" id="{D99D9666-5164-4799-878F-4F22096D7DDE}"/>
               </a:ext>
             </a:extLst>
           </p:cNvPr>
-          <p:cNvSpPr>
-            <a:spLocks noGrp="1"/>
-          </p:cNvSpPr>
+          <p:cNvPicPr>
+            <a:picLocks noGrp="1" noChangeAspect="1"/>
+          </p:cNvPicPr>
           <p:nvPr>
             <p:ph idx="1"/>
           </p:nvPr>
-        </p:nvSpPr>
-        <p:spPr/>
-        <p:txBody>
-          <a:bodyPr/>
-          <a:lstStyle/>
-          <a:p>
-            <a:endParaRPr lang="en-US"/>
-          </a:p>
-        </p:txBody>
-      </p:sp>
+        </p:nvPicPr>
+        <p:blipFill>
+          <a:blip r:embed="rId2">
+            <a:extLst>
+              <a:ext uri="{28A0092B-C50C-407E-A947-70E740481C1C}">
+                <a14:useLocalDpi xmlns:a14="http://schemas.microsoft.com/office/drawing/2010/main" val="0"/>
+              </a:ext>
+            </a:extLst>
+          </a:blip>
+          <a:stretch>
+            <a:fillRect/>
+          </a:stretch>
+        </p:blipFill>
+        <p:spPr>
+          <a:xfrm>
+            <a:off x="1700810" y="1502228"/>
+            <a:ext cx="9337305" cy="4556155"/>
+          </a:xfrm>
+        </p:spPr>
+      </p:pic>
     </p:spTree>
     <p:extLst>
       <p:ext uri="{BB962C8B-B14F-4D97-AF65-F5344CB8AC3E}">

</xml_diff>